<commit_message>
cx_Freeze compile with database: death to Python2.7
</commit_message>
<xml_diff>
--- a/python3.6/PIP_GEN_id-0/PIP_GEN_Procedure.pptx
+++ b/python3.6/PIP_GEN_id-0/PIP_GEN_Procedure.pptx
@@ -170,7 +170,7 @@
           <a:noFill/>
           <a:extLst>
             <a:ext uri="{909E8E84-426E-40dd-AFC4-6F175D3DCCD1}">
-              <a14:hiddenFill xmlns:a14="http://schemas.microsoft.com/office/drawing/2010/main" xmlns="">
+              <a14:hiddenFill xmlns="" xmlns:a14="http://schemas.microsoft.com/office/drawing/2010/main">
                 <a:solidFill>
                   <a:srgbClr val="FFFFFF"/>
                 </a:solidFill>
@@ -230,7 +230,7 @@
             </a:ln>
             <a:extLst>
               <a:ext uri="{91240B29-F687-4f45-9708-019B960494DF}">
-                <a14:hiddenLine xmlns:a14="http://schemas.microsoft.com/office/drawing/2010/main" xmlns="" w="9525">
+                <a14:hiddenLine xmlns="" xmlns:a14="http://schemas.microsoft.com/office/drawing/2010/main" w="9525">
                   <a:solidFill>
                     <a:srgbClr val="000000"/>
                   </a:solidFill>
@@ -320,7 +320,7 @@
             </a:ln>
             <a:extLst>
               <a:ext uri="{91240B29-F687-4f45-9708-019B960494DF}">
-                <a14:hiddenLine xmlns:a14="http://schemas.microsoft.com/office/drawing/2010/main" xmlns="" w="9525">
+                <a14:hiddenLine xmlns="" xmlns:a14="http://schemas.microsoft.com/office/drawing/2010/main" w="9525">
                   <a:solidFill>
                     <a:srgbClr val="000000"/>
                   </a:solidFill>
@@ -410,7 +410,7 @@
             </a:ln>
             <a:extLst>
               <a:ext uri="{91240B29-F687-4f45-9708-019B960494DF}">
-                <a14:hiddenLine xmlns:a14="http://schemas.microsoft.com/office/drawing/2010/main" xmlns="" w="9525">
+                <a14:hiddenLine xmlns="" xmlns:a14="http://schemas.microsoft.com/office/drawing/2010/main" w="9525">
                   <a:solidFill>
                     <a:srgbClr val="000000"/>
                   </a:solidFill>
@@ -444,7 +444,7 @@
             </a:ln>
             <a:extLst>
               <a:ext uri="{91240B29-F687-4f45-9708-019B960494DF}">
-                <a14:hiddenLine xmlns:a14="http://schemas.microsoft.com/office/drawing/2010/main" xmlns="" w="9525">
+                <a14:hiddenLine xmlns="" xmlns:a14="http://schemas.microsoft.com/office/drawing/2010/main" w="9525">
                   <a:solidFill>
                     <a:srgbClr val="000000"/>
                   </a:solidFill>
@@ -534,7 +534,7 @@
             </a:ln>
             <a:extLst>
               <a:ext uri="{91240B29-F687-4f45-9708-019B960494DF}">
-                <a14:hiddenLine xmlns:a14="http://schemas.microsoft.com/office/drawing/2010/main" xmlns="" w="9525">
+                <a14:hiddenLine xmlns="" xmlns:a14="http://schemas.microsoft.com/office/drawing/2010/main" w="9525">
                   <a:solidFill>
                     <a:srgbClr val="000000"/>
                   </a:solidFill>
@@ -596,7 +596,7 @@
             </a:ln>
             <a:extLst>
               <a:ext uri="{91240B29-F687-4f45-9708-019B960494DF}">
-                <a14:hiddenLine xmlns:a14="http://schemas.microsoft.com/office/drawing/2010/main" xmlns="" w="9525">
+                <a14:hiddenLine xmlns="" xmlns:a14="http://schemas.microsoft.com/office/drawing/2010/main" w="9525">
                   <a:solidFill>
                     <a:srgbClr val="000000"/>
                   </a:solidFill>
@@ -658,7 +658,7 @@
             </a:ln>
             <a:extLst>
               <a:ext uri="{91240B29-F687-4f45-9708-019B960494DF}">
-                <a14:hiddenLine xmlns:a14="http://schemas.microsoft.com/office/drawing/2010/main" xmlns="" w="9525">
+                <a14:hiddenLine xmlns="" xmlns:a14="http://schemas.microsoft.com/office/drawing/2010/main" w="9525">
                   <a:solidFill>
                     <a:srgbClr val="000000"/>
                   </a:solidFill>
@@ -748,7 +748,7 @@
             </a:ln>
             <a:extLst>
               <a:ext uri="{91240B29-F687-4f45-9708-019B960494DF}">
-                <a14:hiddenLine xmlns:a14="http://schemas.microsoft.com/office/drawing/2010/main" xmlns="" w="9525">
+                <a14:hiddenLine xmlns="" xmlns:a14="http://schemas.microsoft.com/office/drawing/2010/main" w="9525">
                   <a:solidFill>
                     <a:srgbClr val="000000"/>
                   </a:solidFill>
@@ -810,7 +810,7 @@
             </a:ln>
             <a:extLst>
               <a:ext uri="{91240B29-F687-4f45-9708-019B960494DF}">
-                <a14:hiddenLine xmlns:a14="http://schemas.microsoft.com/office/drawing/2010/main" xmlns="" w="9525">
+                <a14:hiddenLine xmlns="" xmlns:a14="http://schemas.microsoft.com/office/drawing/2010/main" w="9525">
                   <a:solidFill>
                     <a:srgbClr val="000000"/>
                   </a:solidFill>
@@ -872,7 +872,7 @@
             </a:ln>
             <a:extLst>
               <a:ext uri="{91240B29-F687-4f45-9708-019B960494DF}">
-                <a14:hiddenLine xmlns:a14="http://schemas.microsoft.com/office/drawing/2010/main" xmlns="" w="9525">
+                <a14:hiddenLine xmlns="" xmlns:a14="http://schemas.microsoft.com/office/drawing/2010/main" w="9525">
                   <a:solidFill>
                     <a:srgbClr val="000000"/>
                   </a:solidFill>
@@ -962,7 +962,7 @@
             </a:ln>
             <a:extLst>
               <a:ext uri="{91240B29-F687-4f45-9708-019B960494DF}">
-                <a14:hiddenLine xmlns:a14="http://schemas.microsoft.com/office/drawing/2010/main" xmlns="" w="9525">
+                <a14:hiddenLine xmlns="" xmlns:a14="http://schemas.microsoft.com/office/drawing/2010/main" w="9525">
                   <a:solidFill>
                     <a:srgbClr val="000000"/>
                   </a:solidFill>
@@ -1052,7 +1052,7 @@
             </a:ln>
             <a:extLst>
               <a:ext uri="{91240B29-F687-4f45-9708-019B960494DF}">
-                <a14:hiddenLine xmlns:a14="http://schemas.microsoft.com/office/drawing/2010/main" xmlns="" w="9525">
+                <a14:hiddenLine xmlns="" xmlns:a14="http://schemas.microsoft.com/office/drawing/2010/main" w="9525">
                   <a:solidFill>
                     <a:srgbClr val="000000"/>
                   </a:solidFill>
@@ -1114,7 +1114,7 @@
             </a:ln>
             <a:extLst>
               <a:ext uri="{91240B29-F687-4f45-9708-019B960494DF}">
-                <a14:hiddenLine xmlns:a14="http://schemas.microsoft.com/office/drawing/2010/main" xmlns="" w="9525">
+                <a14:hiddenLine xmlns="" xmlns:a14="http://schemas.microsoft.com/office/drawing/2010/main" w="9525">
                   <a:solidFill>
                     <a:srgbClr val="000000"/>
                   </a:solidFill>
@@ -1224,7 +1224,7 @@
             </a:ln>
             <a:extLst>
               <a:ext uri="{91240B29-F687-4f45-9708-019B960494DF}">
-                <a14:hiddenLine xmlns:a14="http://schemas.microsoft.com/office/drawing/2010/main" xmlns="" w="9525">
+                <a14:hiddenLine xmlns="" xmlns:a14="http://schemas.microsoft.com/office/drawing/2010/main" w="9525">
                   <a:solidFill>
                     <a:srgbClr val="000000"/>
                   </a:solidFill>
@@ -1286,7 +1286,7 @@
             </a:ln>
             <a:extLst>
               <a:ext uri="{91240B29-F687-4f45-9708-019B960494DF}">
-                <a14:hiddenLine xmlns:a14="http://schemas.microsoft.com/office/drawing/2010/main" xmlns="" w="9525">
+                <a14:hiddenLine xmlns="" xmlns:a14="http://schemas.microsoft.com/office/drawing/2010/main" w="9525">
                   <a:solidFill>
                     <a:srgbClr val="000000"/>
                   </a:solidFill>
@@ -1376,7 +1376,7 @@
             </a:ln>
             <a:extLst>
               <a:ext uri="{91240B29-F687-4f45-9708-019B960494DF}">
-                <a14:hiddenLine xmlns:a14="http://schemas.microsoft.com/office/drawing/2010/main" xmlns="" w="9525">
+                <a14:hiddenLine xmlns="" xmlns:a14="http://schemas.microsoft.com/office/drawing/2010/main" w="9525">
                   <a:solidFill>
                     <a:srgbClr val="000000"/>
                   </a:solidFill>
@@ -1466,7 +1466,7 @@
             </a:ln>
             <a:extLst>
               <a:ext uri="{91240B29-F687-4f45-9708-019B960494DF}">
-                <a14:hiddenLine xmlns:a14="http://schemas.microsoft.com/office/drawing/2010/main" xmlns="" w="9525">
+                <a14:hiddenLine xmlns="" xmlns:a14="http://schemas.microsoft.com/office/drawing/2010/main" w="9525">
                   <a:solidFill>
                     <a:srgbClr val="000000"/>
                   </a:solidFill>
@@ -1528,7 +1528,7 @@
             </a:ln>
             <a:extLst>
               <a:ext uri="{91240B29-F687-4f45-9708-019B960494DF}">
-                <a14:hiddenLine xmlns:a14="http://schemas.microsoft.com/office/drawing/2010/main" xmlns="" w="9525">
+                <a14:hiddenLine xmlns="" xmlns:a14="http://schemas.microsoft.com/office/drawing/2010/main" w="9525">
                   <a:solidFill>
                     <a:srgbClr val="000000"/>
                   </a:solidFill>
@@ -1618,7 +1618,7 @@
             </a:ln>
             <a:extLst>
               <a:ext uri="{91240B29-F687-4f45-9708-019B960494DF}">
-                <a14:hiddenLine xmlns:a14="http://schemas.microsoft.com/office/drawing/2010/main" xmlns="" w="9525">
+                <a14:hiddenLine xmlns="" xmlns:a14="http://schemas.microsoft.com/office/drawing/2010/main" w="9525">
                   <a:solidFill>
                     <a:srgbClr val="000000"/>
                   </a:solidFill>
@@ -1708,7 +1708,7 @@
             </a:ln>
             <a:extLst>
               <a:ext uri="{91240B29-F687-4f45-9708-019B960494DF}">
-                <a14:hiddenLine xmlns:a14="http://schemas.microsoft.com/office/drawing/2010/main" xmlns="" w="9525">
+                <a14:hiddenLine xmlns="" xmlns:a14="http://schemas.microsoft.com/office/drawing/2010/main" w="9525">
                   <a:solidFill>
                     <a:srgbClr val="000000"/>
                   </a:solidFill>
@@ -1764,7 +1764,7 @@
             </a:ln>
             <a:extLst>
               <a:ext uri="{91240B29-F687-4f45-9708-019B960494DF}">
-                <a14:hiddenLine xmlns:a14="http://schemas.microsoft.com/office/drawing/2010/main" xmlns="" w="9525">
+                <a14:hiddenLine xmlns="" xmlns:a14="http://schemas.microsoft.com/office/drawing/2010/main" w="9525">
                   <a:solidFill>
                     <a:srgbClr val="000000"/>
                   </a:solidFill>
@@ -1854,7 +1854,7 @@
             </a:ln>
             <a:extLst>
               <a:ext uri="{91240B29-F687-4f45-9708-019B960494DF}">
-                <a14:hiddenLine xmlns:a14="http://schemas.microsoft.com/office/drawing/2010/main" xmlns="" w="9525">
+                <a14:hiddenLine xmlns="" xmlns:a14="http://schemas.microsoft.com/office/drawing/2010/main" w="9525">
                   <a:solidFill>
                     <a:srgbClr val="000000"/>
                   </a:solidFill>
@@ -1910,7 +1910,7 @@
             </a:ln>
             <a:extLst>
               <a:ext uri="{91240B29-F687-4f45-9708-019B960494DF}">
-                <a14:hiddenLine xmlns:a14="http://schemas.microsoft.com/office/drawing/2010/main" xmlns="" w="9525">
+                <a14:hiddenLine xmlns="" xmlns:a14="http://schemas.microsoft.com/office/drawing/2010/main" w="9525">
                   <a:solidFill>
                     <a:srgbClr val="000000"/>
                   </a:solidFill>
@@ -2000,7 +2000,7 @@
             </a:ln>
             <a:extLst>
               <a:ext uri="{91240B29-F687-4f45-9708-019B960494DF}">
-                <a14:hiddenLine xmlns:a14="http://schemas.microsoft.com/office/drawing/2010/main" xmlns="" w="9525">
+                <a14:hiddenLine xmlns="" xmlns:a14="http://schemas.microsoft.com/office/drawing/2010/main" w="9525">
                   <a:solidFill>
                     <a:srgbClr val="000000"/>
                   </a:solidFill>
@@ -2068,7 +2068,7 @@
             </a:ln>
             <a:extLst>
               <a:ext uri="{91240B29-F687-4f45-9708-019B960494DF}">
-                <a14:hiddenLine xmlns:a14="http://schemas.microsoft.com/office/drawing/2010/main" xmlns="" w="9525">
+                <a14:hiddenLine xmlns="" xmlns:a14="http://schemas.microsoft.com/office/drawing/2010/main" w="9525">
                   <a:solidFill>
                     <a:srgbClr val="000000"/>
                   </a:solidFill>
@@ -2158,7 +2158,7 @@
             </a:ln>
             <a:extLst>
               <a:ext uri="{91240B29-F687-4f45-9708-019B960494DF}">
-                <a14:hiddenLine xmlns:a14="http://schemas.microsoft.com/office/drawing/2010/main" xmlns="" w="9525">
+                <a14:hiddenLine xmlns="" xmlns:a14="http://schemas.microsoft.com/office/drawing/2010/main" w="9525">
                   <a:solidFill>
                     <a:srgbClr val="000000"/>
                   </a:solidFill>
@@ -2226,7 +2226,7 @@
             </a:ln>
             <a:extLst>
               <a:ext uri="{91240B29-F687-4f45-9708-019B960494DF}">
-                <a14:hiddenLine xmlns:a14="http://schemas.microsoft.com/office/drawing/2010/main" xmlns="" w="9525">
+                <a14:hiddenLine xmlns="" xmlns:a14="http://schemas.microsoft.com/office/drawing/2010/main" w="9525">
                   <a:solidFill>
                     <a:srgbClr val="000000"/>
                   </a:solidFill>
@@ -2316,7 +2316,7 @@
             </a:ln>
             <a:extLst>
               <a:ext uri="{91240B29-F687-4f45-9708-019B960494DF}">
-                <a14:hiddenLine xmlns:a14="http://schemas.microsoft.com/office/drawing/2010/main" xmlns="" w="9525">
+                <a14:hiddenLine xmlns="" xmlns:a14="http://schemas.microsoft.com/office/drawing/2010/main" w="9525">
                   <a:solidFill>
                     <a:srgbClr val="000000"/>
                   </a:solidFill>
@@ -2350,7 +2350,7 @@
             </a:ln>
             <a:extLst>
               <a:ext uri="{91240B29-F687-4f45-9708-019B960494DF}">
-                <a14:hiddenLine xmlns:a14="http://schemas.microsoft.com/office/drawing/2010/main" xmlns="" w="9525">
+                <a14:hiddenLine xmlns="" xmlns:a14="http://schemas.microsoft.com/office/drawing/2010/main" w="9525">
                   <a:solidFill>
                     <a:srgbClr val="000000"/>
                   </a:solidFill>
@@ -2440,7 +2440,7 @@
             </a:ln>
             <a:extLst>
               <a:ext uri="{91240B29-F687-4f45-9708-019B960494DF}">
-                <a14:hiddenLine xmlns:a14="http://schemas.microsoft.com/office/drawing/2010/main" xmlns="" w="9525">
+                <a14:hiddenLine xmlns="" xmlns:a14="http://schemas.microsoft.com/office/drawing/2010/main" w="9525">
                   <a:solidFill>
                     <a:srgbClr val="000000"/>
                   </a:solidFill>
@@ -2502,7 +2502,7 @@
             </a:ln>
             <a:extLst>
               <a:ext uri="{91240B29-F687-4f45-9708-019B960494DF}">
-                <a14:hiddenLine xmlns:a14="http://schemas.microsoft.com/office/drawing/2010/main" xmlns="" w="9525">
+                <a14:hiddenLine xmlns="" xmlns:a14="http://schemas.microsoft.com/office/drawing/2010/main" w="9525">
                   <a:solidFill>
                     <a:srgbClr val="000000"/>
                   </a:solidFill>
@@ -2564,7 +2564,7 @@
             </a:ln>
             <a:extLst>
               <a:ext uri="{91240B29-F687-4f45-9708-019B960494DF}">
-                <a14:hiddenLine xmlns:a14="http://schemas.microsoft.com/office/drawing/2010/main" xmlns="" w="9525">
+                <a14:hiddenLine xmlns="" xmlns:a14="http://schemas.microsoft.com/office/drawing/2010/main" w="9525">
                   <a:solidFill>
                     <a:srgbClr val="000000"/>
                   </a:solidFill>
@@ -2654,7 +2654,7 @@
             </a:ln>
             <a:extLst>
               <a:ext uri="{91240B29-F687-4f45-9708-019B960494DF}">
-                <a14:hiddenLine xmlns:a14="http://schemas.microsoft.com/office/drawing/2010/main" xmlns="" w="9525">
+                <a14:hiddenLine xmlns="" xmlns:a14="http://schemas.microsoft.com/office/drawing/2010/main" w="9525">
                   <a:solidFill>
                     <a:srgbClr val="000000"/>
                   </a:solidFill>
@@ -2722,7 +2722,7 @@
             </a:ln>
             <a:extLst>
               <a:ext uri="{91240B29-F687-4f45-9708-019B960494DF}">
-                <a14:hiddenLine xmlns:a14="http://schemas.microsoft.com/office/drawing/2010/main" xmlns="" w="9525">
+                <a14:hiddenLine xmlns="" xmlns:a14="http://schemas.microsoft.com/office/drawing/2010/main" w="9525">
                   <a:solidFill>
                     <a:srgbClr val="000000"/>
                   </a:solidFill>
@@ -2784,7 +2784,7 @@
             </a:ln>
             <a:extLst>
               <a:ext uri="{91240B29-F687-4f45-9708-019B960494DF}">
-                <a14:hiddenLine xmlns:a14="http://schemas.microsoft.com/office/drawing/2010/main" xmlns="" w="9525">
+                <a14:hiddenLine xmlns="" xmlns:a14="http://schemas.microsoft.com/office/drawing/2010/main" w="9525">
                   <a:solidFill>
                     <a:srgbClr val="000000"/>
                   </a:solidFill>
@@ -2874,7 +2874,7 @@
             </a:ln>
             <a:extLst>
               <a:ext uri="{91240B29-F687-4f45-9708-019B960494DF}">
-                <a14:hiddenLine xmlns:a14="http://schemas.microsoft.com/office/drawing/2010/main" xmlns="" w="9525">
+                <a14:hiddenLine xmlns="" xmlns:a14="http://schemas.microsoft.com/office/drawing/2010/main" w="9525">
                   <a:solidFill>
                     <a:srgbClr val="000000"/>
                   </a:solidFill>
@@ -2936,7 +2936,7 @@
             </a:ln>
             <a:extLst>
               <a:ext uri="{91240B29-F687-4f45-9708-019B960494DF}">
-                <a14:hiddenLine xmlns:a14="http://schemas.microsoft.com/office/drawing/2010/main" xmlns="" w="9525">
+                <a14:hiddenLine xmlns="" xmlns:a14="http://schemas.microsoft.com/office/drawing/2010/main" w="9525">
                   <a:solidFill>
                     <a:srgbClr val="000000"/>
                   </a:solidFill>
@@ -3026,7 +3026,7 @@
             </a:ln>
             <a:extLst>
               <a:ext uri="{91240B29-F687-4f45-9708-019B960494DF}">
-                <a14:hiddenLine xmlns:a14="http://schemas.microsoft.com/office/drawing/2010/main" xmlns="" w="9525">
+                <a14:hiddenLine xmlns="" xmlns:a14="http://schemas.microsoft.com/office/drawing/2010/main" w="9525">
                   <a:solidFill>
                     <a:srgbClr val="000000"/>
                   </a:solidFill>
@@ -3088,7 +3088,7 @@
             </a:ln>
             <a:extLst>
               <a:ext uri="{91240B29-F687-4f45-9708-019B960494DF}">
-                <a14:hiddenLine xmlns:a14="http://schemas.microsoft.com/office/drawing/2010/main" xmlns="" w="9525">
+                <a14:hiddenLine xmlns="" xmlns:a14="http://schemas.microsoft.com/office/drawing/2010/main" w="9525">
                   <a:solidFill>
                     <a:srgbClr val="000000"/>
                   </a:solidFill>
@@ -3178,7 +3178,7 @@
             </a:ln>
             <a:extLst>
               <a:ext uri="{91240B29-F687-4f45-9708-019B960494DF}">
-                <a14:hiddenLine xmlns:a14="http://schemas.microsoft.com/office/drawing/2010/main" xmlns="" w="9525">
+                <a14:hiddenLine xmlns="" xmlns:a14="http://schemas.microsoft.com/office/drawing/2010/main" w="9525">
                   <a:solidFill>
                     <a:srgbClr val="000000"/>
                   </a:solidFill>
@@ -3212,7 +3212,7 @@
             </a:ln>
             <a:extLst>
               <a:ext uri="{91240B29-F687-4f45-9708-019B960494DF}">
-                <a14:hiddenLine xmlns:a14="http://schemas.microsoft.com/office/drawing/2010/main" xmlns="" w="9525">
+                <a14:hiddenLine xmlns="" xmlns:a14="http://schemas.microsoft.com/office/drawing/2010/main" w="9525">
                   <a:solidFill>
                     <a:srgbClr val="000000"/>
                   </a:solidFill>
@@ -3277,7 +3277,7 @@
             </a:ln>
             <a:extLst>
               <a:ext uri="{91240B29-F687-4f45-9708-019B960494DF}">
-                <a14:hiddenLine xmlns:a14="http://schemas.microsoft.com/office/drawing/2010/main" xmlns="" w="9525">
+                <a14:hiddenLine xmlns="" xmlns:a14="http://schemas.microsoft.com/office/drawing/2010/main" w="9525">
                   <a:solidFill>
                     <a:srgbClr val="000000"/>
                   </a:solidFill>
@@ -3367,7 +3367,7 @@
             </a:ln>
             <a:extLst>
               <a:ext uri="{91240B29-F687-4f45-9708-019B960494DF}">
-                <a14:hiddenLine xmlns:a14="http://schemas.microsoft.com/office/drawing/2010/main" xmlns="" w="9525">
+                <a14:hiddenLine xmlns="" xmlns:a14="http://schemas.microsoft.com/office/drawing/2010/main" w="9525">
                   <a:solidFill>
                     <a:srgbClr val="000000"/>
                   </a:solidFill>
@@ -3429,7 +3429,7 @@
             </a:ln>
             <a:extLst>
               <a:ext uri="{91240B29-F687-4f45-9708-019B960494DF}">
-                <a14:hiddenLine xmlns:a14="http://schemas.microsoft.com/office/drawing/2010/main" xmlns="" w="9525">
+                <a14:hiddenLine xmlns="" xmlns:a14="http://schemas.microsoft.com/office/drawing/2010/main" w="9525">
                   <a:solidFill>
                     <a:srgbClr val="000000"/>
                   </a:solidFill>
@@ -3519,7 +3519,7 @@
             </a:ln>
             <a:extLst>
               <a:ext uri="{91240B29-F687-4f45-9708-019B960494DF}">
-                <a14:hiddenLine xmlns:a14="http://schemas.microsoft.com/office/drawing/2010/main" xmlns="" w="9525">
+                <a14:hiddenLine xmlns="" xmlns:a14="http://schemas.microsoft.com/office/drawing/2010/main" w="9525">
                   <a:solidFill>
                     <a:srgbClr val="000000"/>
                   </a:solidFill>
@@ -3609,7 +3609,7 @@
             </a:ln>
             <a:extLst>
               <a:ext uri="{91240B29-F687-4f45-9708-019B960494DF}">
-                <a14:hiddenLine xmlns:a14="http://schemas.microsoft.com/office/drawing/2010/main" xmlns="" w="9525">
+                <a14:hiddenLine xmlns="" xmlns:a14="http://schemas.microsoft.com/office/drawing/2010/main" w="9525">
                   <a:solidFill>
                     <a:srgbClr val="000000"/>
                   </a:solidFill>
@@ -3674,7 +3674,7 @@
             </a:ln>
             <a:extLst>
               <a:ext uri="{91240B29-F687-4f45-9708-019B960494DF}">
-                <a14:hiddenLine xmlns:a14="http://schemas.microsoft.com/office/drawing/2010/main" xmlns="" w="9525">
+                <a14:hiddenLine xmlns="" xmlns:a14="http://schemas.microsoft.com/office/drawing/2010/main" w="9525">
                   <a:solidFill>
                     <a:srgbClr val="000000"/>
                   </a:solidFill>
@@ -3736,7 +3736,7 @@
             </a:ln>
             <a:extLst>
               <a:ext uri="{91240B29-F687-4f45-9708-019B960494DF}">
-                <a14:hiddenLine xmlns:a14="http://schemas.microsoft.com/office/drawing/2010/main" xmlns="" w="9525">
+                <a14:hiddenLine xmlns="" xmlns:a14="http://schemas.microsoft.com/office/drawing/2010/main" w="9525">
                   <a:solidFill>
                     <a:srgbClr val="000000"/>
                   </a:solidFill>
@@ -3826,7 +3826,7 @@
             </a:ln>
             <a:extLst>
               <a:ext uri="{91240B29-F687-4f45-9708-019B960494DF}">
-                <a14:hiddenLine xmlns:a14="http://schemas.microsoft.com/office/drawing/2010/main" xmlns="" w="9525">
+                <a14:hiddenLine xmlns="" xmlns:a14="http://schemas.microsoft.com/office/drawing/2010/main" w="9525">
                   <a:solidFill>
                     <a:srgbClr val="000000"/>
                   </a:solidFill>
@@ -3916,7 +3916,7 @@
             </a:ln>
             <a:extLst>
               <a:ext uri="{91240B29-F687-4f45-9708-019B960494DF}">
-                <a14:hiddenLine xmlns:a14="http://schemas.microsoft.com/office/drawing/2010/main" xmlns="" w="9525">
+                <a14:hiddenLine xmlns="" xmlns:a14="http://schemas.microsoft.com/office/drawing/2010/main" w="9525">
                   <a:solidFill>
                     <a:srgbClr val="000000"/>
                   </a:solidFill>
@@ -3978,7 +3978,7 @@
             </a:ln>
             <a:extLst>
               <a:ext uri="{91240B29-F687-4f45-9708-019B960494DF}">
-                <a14:hiddenLine xmlns:a14="http://schemas.microsoft.com/office/drawing/2010/main" xmlns="" w="9525">
+                <a14:hiddenLine xmlns="" xmlns:a14="http://schemas.microsoft.com/office/drawing/2010/main" w="9525">
                   <a:solidFill>
                     <a:srgbClr val="000000"/>
                   </a:solidFill>
@@ -4098,7 +4098,7 @@
             </a:ln>
             <a:extLst>
               <a:ext uri="{91240B29-F687-4f45-9708-019B960494DF}">
-                <a14:hiddenLine xmlns:a14="http://schemas.microsoft.com/office/drawing/2010/main" xmlns="" w="9525">
+                <a14:hiddenLine xmlns="" xmlns:a14="http://schemas.microsoft.com/office/drawing/2010/main" w="9525">
                   <a:solidFill>
                     <a:srgbClr val="000000"/>
                   </a:solidFill>
@@ -4166,7 +4166,7 @@
             </a:ln>
             <a:extLst>
               <a:ext uri="{91240B29-F687-4f45-9708-019B960494DF}">
-                <a14:hiddenLine xmlns:a14="http://schemas.microsoft.com/office/drawing/2010/main" xmlns="" w="9525">
+                <a14:hiddenLine xmlns="" xmlns:a14="http://schemas.microsoft.com/office/drawing/2010/main" w="9525">
                   <a:solidFill>
                     <a:srgbClr val="000000"/>
                   </a:solidFill>
@@ -4256,7 +4256,7 @@
             </a:ln>
             <a:extLst>
               <a:ext uri="{91240B29-F687-4f45-9708-019B960494DF}">
-                <a14:hiddenLine xmlns:a14="http://schemas.microsoft.com/office/drawing/2010/main" xmlns="" w="9525">
+                <a14:hiddenLine xmlns="" xmlns:a14="http://schemas.microsoft.com/office/drawing/2010/main" w="9525">
                   <a:solidFill>
                     <a:srgbClr val="000000"/>
                   </a:solidFill>
@@ -4396,7 +4396,7 @@
           <a:p>
             <a:fld id="{48A87A34-81AB-432B-8DAE-1953F412C126}" type="datetimeFigureOut">
               <a:rPr lang="en-US" dirty="0"/>
-              <a:t>2/26/2018</a:t>
+              <a:t>3/7/2018</a:t>
             </a:fld>
             <a:endParaRPr lang="en-US" dirty="0"/>
           </a:p>
@@ -4658,7 +4658,7 @@
           <a:p>
             <a:fld id="{48A87A34-81AB-432B-8DAE-1953F412C126}" type="datetimeFigureOut">
               <a:rPr lang="en-US" dirty="0"/>
-              <a:t>2/26/2018</a:t>
+              <a:t>3/7/2018</a:t>
             </a:fld>
             <a:endParaRPr lang="en-US" dirty="0"/>
           </a:p>
@@ -4849,7 +4849,7 @@
           <a:p>
             <a:fld id="{48A87A34-81AB-432B-8DAE-1953F412C126}" type="datetimeFigureOut">
               <a:rPr lang="en-US" dirty="0"/>
-              <a:t>2/26/2018</a:t>
+              <a:t>3/7/2018</a:t>
             </a:fld>
             <a:endParaRPr lang="en-US" dirty="0"/>
           </a:p>
@@ -5107,7 +5107,7 @@
           <a:p>
             <a:fld id="{48A87A34-81AB-432B-8DAE-1953F412C126}" type="datetimeFigureOut">
               <a:rPr lang="en-US" dirty="0"/>
-              <a:t>2/26/2018</a:t>
+              <a:t>3/7/2018</a:t>
             </a:fld>
             <a:endParaRPr lang="en-US" dirty="0"/>
           </a:p>
@@ -5536,7 +5536,7 @@
           <a:p>
             <a:fld id="{48A87A34-81AB-432B-8DAE-1953F412C126}" type="datetimeFigureOut">
               <a:rPr lang="en-US" dirty="0"/>
-              <a:t>2/26/2018</a:t>
+              <a:t>3/7/2018</a:t>
             </a:fld>
             <a:endParaRPr lang="en-US" dirty="0"/>
           </a:p>
@@ -6077,7 +6077,7 @@
           <a:p>
             <a:fld id="{48A87A34-81AB-432B-8DAE-1953F412C126}" type="datetimeFigureOut">
               <a:rPr lang="en-US" dirty="0"/>
-              <a:t>2/26/2018</a:t>
+              <a:t>3/7/2018</a:t>
             </a:fld>
             <a:endParaRPr lang="en-US" dirty="0"/>
           </a:p>
@@ -6792,7 +6792,7 @@
           <a:p>
             <a:fld id="{48A87A34-81AB-432B-8DAE-1953F412C126}" type="datetimeFigureOut">
               <a:rPr lang="en-US" dirty="0"/>
-              <a:t>2/26/2018</a:t>
+              <a:t>3/7/2018</a:t>
             </a:fld>
             <a:endParaRPr lang="en-US" dirty="0"/>
           </a:p>
@@ -6957,7 +6957,7 @@
           <a:p>
             <a:fld id="{48A87A34-81AB-432B-8DAE-1953F412C126}" type="datetimeFigureOut">
               <a:rPr lang="en-US" dirty="0"/>
-              <a:t>2/26/2018</a:t>
+              <a:t>3/7/2018</a:t>
             </a:fld>
             <a:endParaRPr lang="en-US" dirty="0"/>
           </a:p>
@@ -7132,7 +7132,7 @@
           <a:p>
             <a:fld id="{48A87A34-81AB-432B-8DAE-1953F412C126}" type="datetimeFigureOut">
               <a:rPr lang="en-US" dirty="0"/>
-              <a:t>2/26/2018</a:t>
+              <a:t>3/7/2018</a:t>
             </a:fld>
             <a:endParaRPr lang="en-US" dirty="0"/>
           </a:p>
@@ -7297,7 +7297,7 @@
           <a:p>
             <a:fld id="{48A87A34-81AB-432B-8DAE-1953F412C126}" type="datetimeFigureOut">
               <a:rPr lang="en-US" dirty="0"/>
-              <a:t>2/26/2018</a:t>
+              <a:t>3/7/2018</a:t>
             </a:fld>
             <a:endParaRPr lang="en-US" dirty="0"/>
           </a:p>
@@ -7542,7 +7542,7 @@
           <a:p>
             <a:fld id="{48A87A34-81AB-432B-8DAE-1953F412C126}" type="datetimeFigureOut">
               <a:rPr lang="en-US" dirty="0"/>
-              <a:t>2/26/2018</a:t>
+              <a:t>3/7/2018</a:t>
             </a:fld>
             <a:endParaRPr lang="en-US" dirty="0"/>
           </a:p>
@@ -7769,7 +7769,7 @@
           <a:p>
             <a:fld id="{48A87A34-81AB-432B-8DAE-1953F412C126}" type="datetimeFigureOut">
               <a:rPr lang="en-US" dirty="0"/>
-              <a:t>2/26/2018</a:t>
+              <a:t>3/7/2018</a:t>
             </a:fld>
             <a:endParaRPr lang="en-US" dirty="0"/>
           </a:p>
@@ -8145,7 +8145,7 @@
           <a:p>
             <a:fld id="{48A87A34-81AB-432B-8DAE-1953F412C126}" type="datetimeFigureOut">
               <a:rPr lang="en-US" dirty="0"/>
-              <a:t>2/26/2018</a:t>
+              <a:t>3/7/2018</a:t>
             </a:fld>
             <a:endParaRPr lang="en-US" dirty="0"/>
           </a:p>
@@ -8258,7 +8258,7 @@
           <a:p>
             <a:fld id="{48A87A34-81AB-432B-8DAE-1953F412C126}" type="datetimeFigureOut">
               <a:rPr lang="en-US" dirty="0"/>
-              <a:t>2/26/2018</a:t>
+              <a:t>3/7/2018</a:t>
             </a:fld>
             <a:endParaRPr lang="en-US" dirty="0"/>
           </a:p>
@@ -8348,7 +8348,7 @@
           <a:p>
             <a:fld id="{48A87A34-81AB-432B-8DAE-1953F412C126}" type="datetimeFigureOut">
               <a:rPr lang="en-US" dirty="0"/>
-              <a:t>2/26/2018</a:t>
+              <a:t>3/7/2018</a:t>
             </a:fld>
             <a:endParaRPr lang="en-US" dirty="0"/>
           </a:p>
@@ -8592,7 +8592,7 @@
           <a:p>
             <a:fld id="{48A87A34-81AB-432B-8DAE-1953F412C126}" type="datetimeFigureOut">
               <a:rPr lang="en-US" dirty="0"/>
-              <a:t>2/26/2018</a:t>
+              <a:t>3/7/2018</a:t>
             </a:fld>
             <a:endParaRPr lang="en-US" dirty="0"/>
           </a:p>
@@ -8867,7 +8867,7 @@
           <a:p>
             <a:fld id="{48A87A34-81AB-432B-8DAE-1953F412C126}" type="datetimeFigureOut">
               <a:rPr lang="en-US" dirty="0"/>
-              <a:t>2/26/2018</a:t>
+              <a:t>3/7/2018</a:t>
             </a:fld>
             <a:endParaRPr lang="en-US" dirty="0"/>
           </a:p>
@@ -8978,7 +8978,7 @@
           <a:noFill/>
           <a:extLst>
             <a:ext uri="{909E8E84-426E-40dd-AFC4-6F175D3DCCD1}">
-              <a14:hiddenFill xmlns:a14="http://schemas.microsoft.com/office/drawing/2010/main" xmlns="">
+              <a14:hiddenFill xmlns="" xmlns:a14="http://schemas.microsoft.com/office/drawing/2010/main">
                 <a:solidFill>
                   <a:srgbClr val="FFFFFF"/>
                 </a:solidFill>
@@ -9052,7 +9052,7 @@
               </a:ln>
               <a:extLst>
                 <a:ext uri="{91240B29-F687-4f45-9708-019B960494DF}">
-                  <a14:hiddenLine xmlns:a14="http://schemas.microsoft.com/office/drawing/2010/main" xmlns="" w="9525">
+                  <a14:hiddenLine xmlns="" xmlns:a14="http://schemas.microsoft.com/office/drawing/2010/main" w="9525">
                     <a:solidFill>
                       <a:srgbClr val="000000"/>
                     </a:solidFill>
@@ -9142,7 +9142,7 @@
               </a:ln>
               <a:extLst>
                 <a:ext uri="{91240B29-F687-4f45-9708-019B960494DF}">
-                  <a14:hiddenLine xmlns:a14="http://schemas.microsoft.com/office/drawing/2010/main" xmlns="" w="9525">
+                  <a14:hiddenLine xmlns="" xmlns:a14="http://schemas.microsoft.com/office/drawing/2010/main" w="9525">
                     <a:solidFill>
                       <a:srgbClr val="000000"/>
                     </a:solidFill>
@@ -9232,7 +9232,7 @@
               </a:ln>
               <a:extLst>
                 <a:ext uri="{91240B29-F687-4f45-9708-019B960494DF}">
-                  <a14:hiddenLine xmlns:a14="http://schemas.microsoft.com/office/drawing/2010/main" xmlns="" w="9525">
+                  <a14:hiddenLine xmlns="" xmlns:a14="http://schemas.microsoft.com/office/drawing/2010/main" w="9525">
                     <a:solidFill>
                       <a:srgbClr val="000000"/>
                     </a:solidFill>
@@ -9294,7 +9294,7 @@
               </a:ln>
               <a:extLst>
                 <a:ext uri="{91240B29-F687-4f45-9708-019B960494DF}">
-                  <a14:hiddenLine xmlns:a14="http://schemas.microsoft.com/office/drawing/2010/main" xmlns="" w="9525">
+                  <a14:hiddenLine xmlns="" xmlns:a14="http://schemas.microsoft.com/office/drawing/2010/main" w="9525">
                     <a:solidFill>
                       <a:srgbClr val="000000"/>
                     </a:solidFill>
@@ -9384,7 +9384,7 @@
               </a:ln>
               <a:extLst>
                 <a:ext uri="{91240B29-F687-4f45-9708-019B960494DF}">
-                  <a14:hiddenLine xmlns:a14="http://schemas.microsoft.com/office/drawing/2010/main" xmlns="" w="9525">
+                  <a14:hiddenLine xmlns="" xmlns:a14="http://schemas.microsoft.com/office/drawing/2010/main" w="9525">
                     <a:solidFill>
                       <a:srgbClr val="000000"/>
                     </a:solidFill>
@@ -9446,7 +9446,7 @@
               </a:ln>
               <a:extLst>
                 <a:ext uri="{91240B29-F687-4f45-9708-019B960494DF}">
-                  <a14:hiddenLine xmlns:a14="http://schemas.microsoft.com/office/drawing/2010/main" xmlns="" w="9525">
+                  <a14:hiddenLine xmlns="" xmlns:a14="http://schemas.microsoft.com/office/drawing/2010/main" w="9525">
                     <a:solidFill>
                       <a:srgbClr val="000000"/>
                     </a:solidFill>
@@ -9508,7 +9508,7 @@
               </a:ln>
               <a:extLst>
                 <a:ext uri="{91240B29-F687-4f45-9708-019B960494DF}">
-                  <a14:hiddenLine xmlns:a14="http://schemas.microsoft.com/office/drawing/2010/main" xmlns="" w="9525">
+                  <a14:hiddenLine xmlns="" xmlns:a14="http://schemas.microsoft.com/office/drawing/2010/main" w="9525">
                     <a:solidFill>
                       <a:srgbClr val="000000"/>
                     </a:solidFill>
@@ -9598,7 +9598,7 @@
               </a:ln>
               <a:extLst>
                 <a:ext uri="{91240B29-F687-4f45-9708-019B960494DF}">
-                  <a14:hiddenLine xmlns:a14="http://schemas.microsoft.com/office/drawing/2010/main" xmlns="" w="9525">
+                  <a14:hiddenLine xmlns="" xmlns:a14="http://schemas.microsoft.com/office/drawing/2010/main" w="9525">
                     <a:solidFill>
                       <a:srgbClr val="000000"/>
                     </a:solidFill>
@@ -9688,7 +9688,7 @@
               </a:ln>
               <a:extLst>
                 <a:ext uri="{91240B29-F687-4f45-9708-019B960494DF}">
-                  <a14:hiddenLine xmlns:a14="http://schemas.microsoft.com/office/drawing/2010/main" xmlns="" w="9525">
+                  <a14:hiddenLine xmlns="" xmlns:a14="http://schemas.microsoft.com/office/drawing/2010/main" w="9525">
                     <a:solidFill>
                       <a:srgbClr val="000000"/>
                     </a:solidFill>
@@ -9750,7 +9750,7 @@
               </a:ln>
               <a:extLst>
                 <a:ext uri="{91240B29-F687-4f45-9708-019B960494DF}">
-                  <a14:hiddenLine xmlns:a14="http://schemas.microsoft.com/office/drawing/2010/main" xmlns="" w="9525">
+                  <a14:hiddenLine xmlns="" xmlns:a14="http://schemas.microsoft.com/office/drawing/2010/main" w="9525">
                     <a:solidFill>
                       <a:srgbClr val="000000"/>
                     </a:solidFill>
@@ -9860,7 +9860,7 @@
               </a:ln>
               <a:extLst>
                 <a:ext uri="{91240B29-F687-4f45-9708-019B960494DF}">
-                  <a14:hiddenLine xmlns:a14="http://schemas.microsoft.com/office/drawing/2010/main" xmlns="" w="9525">
+                  <a14:hiddenLine xmlns="" xmlns:a14="http://schemas.microsoft.com/office/drawing/2010/main" w="9525">
                     <a:solidFill>
                       <a:srgbClr val="000000"/>
                     </a:solidFill>
@@ -9944,7 +9944,7 @@
               </a:ln>
               <a:extLst>
                 <a:ext uri="{91240B29-F687-4f45-9708-019B960494DF}">
-                  <a14:hiddenLine xmlns:a14="http://schemas.microsoft.com/office/drawing/2010/main" xmlns="" w="9525">
+                  <a14:hiddenLine xmlns="" xmlns:a14="http://schemas.microsoft.com/office/drawing/2010/main" w="9525">
                     <a:solidFill>
                       <a:srgbClr val="000000"/>
                     </a:solidFill>
@@ -10006,7 +10006,7 @@
               </a:ln>
               <a:extLst>
                 <a:ext uri="{91240B29-F687-4f45-9708-019B960494DF}">
-                  <a14:hiddenLine xmlns:a14="http://schemas.microsoft.com/office/drawing/2010/main" xmlns="" w="9525">
+                  <a14:hiddenLine xmlns="" xmlns:a14="http://schemas.microsoft.com/office/drawing/2010/main" w="9525">
                     <a:solidFill>
                       <a:srgbClr val="000000"/>
                     </a:solidFill>
@@ -10068,7 +10068,7 @@
               </a:ln>
               <a:extLst>
                 <a:ext uri="{91240B29-F687-4f45-9708-019B960494DF}">
-                  <a14:hiddenLine xmlns:a14="http://schemas.microsoft.com/office/drawing/2010/main" xmlns="" w="9525">
+                  <a14:hiddenLine xmlns="" xmlns:a14="http://schemas.microsoft.com/office/drawing/2010/main" w="9525">
                     <a:solidFill>
                       <a:srgbClr val="000000"/>
                     </a:solidFill>
@@ -10158,7 +10158,7 @@
               </a:ln>
               <a:extLst>
                 <a:ext uri="{91240B29-F687-4f45-9708-019B960494DF}">
-                  <a14:hiddenLine xmlns:a14="http://schemas.microsoft.com/office/drawing/2010/main" xmlns="" w="9525">
+                  <a14:hiddenLine xmlns="" xmlns:a14="http://schemas.microsoft.com/office/drawing/2010/main" w="9525">
                     <a:solidFill>
                       <a:srgbClr val="000000"/>
                     </a:solidFill>
@@ -10192,7 +10192,7 @@
               </a:ln>
               <a:extLst>
                 <a:ext uri="{91240B29-F687-4f45-9708-019B960494DF}">
-                  <a14:hiddenLine xmlns:a14="http://schemas.microsoft.com/office/drawing/2010/main" xmlns="" w="9525">
+                  <a14:hiddenLine xmlns="" xmlns:a14="http://schemas.microsoft.com/office/drawing/2010/main" w="9525">
                     <a:solidFill>
                       <a:srgbClr val="000000"/>
                     </a:solidFill>
@@ -10257,7 +10257,7 @@
               </a:ln>
               <a:extLst>
                 <a:ext uri="{91240B29-F687-4f45-9708-019B960494DF}">
-                  <a14:hiddenLine xmlns:a14="http://schemas.microsoft.com/office/drawing/2010/main" xmlns="" w="9525">
+                  <a14:hiddenLine xmlns="" xmlns:a14="http://schemas.microsoft.com/office/drawing/2010/main" w="9525">
                     <a:solidFill>
                       <a:srgbClr val="000000"/>
                     </a:solidFill>
@@ -10347,7 +10347,7 @@
               </a:ln>
               <a:extLst>
                 <a:ext uri="{91240B29-F687-4f45-9708-019B960494DF}">
-                  <a14:hiddenLine xmlns:a14="http://schemas.microsoft.com/office/drawing/2010/main" xmlns="" w="9525">
+                  <a14:hiddenLine xmlns="" xmlns:a14="http://schemas.microsoft.com/office/drawing/2010/main" w="9525">
                     <a:solidFill>
                       <a:srgbClr val="000000"/>
                     </a:solidFill>
@@ -10409,7 +10409,7 @@
               </a:ln>
               <a:extLst>
                 <a:ext uri="{91240B29-F687-4f45-9708-019B960494DF}">
-                  <a14:hiddenLine xmlns:a14="http://schemas.microsoft.com/office/drawing/2010/main" xmlns="" w="9525">
+                  <a14:hiddenLine xmlns="" xmlns:a14="http://schemas.microsoft.com/office/drawing/2010/main" w="9525">
                     <a:solidFill>
                       <a:srgbClr val="000000"/>
                     </a:solidFill>
@@ -10499,7 +10499,7 @@
               </a:ln>
               <a:extLst>
                 <a:ext uri="{91240B29-F687-4f45-9708-019B960494DF}">
-                  <a14:hiddenLine xmlns:a14="http://schemas.microsoft.com/office/drawing/2010/main" xmlns="" w="9525">
+                  <a14:hiddenLine xmlns="" xmlns:a14="http://schemas.microsoft.com/office/drawing/2010/main" w="9525">
                     <a:solidFill>
                       <a:srgbClr val="000000"/>
                     </a:solidFill>
@@ -10564,7 +10564,7 @@
               </a:ln>
               <a:extLst>
                 <a:ext uri="{91240B29-F687-4f45-9708-019B960494DF}">
-                  <a14:hiddenLine xmlns:a14="http://schemas.microsoft.com/office/drawing/2010/main" xmlns="" w="9525">
+                  <a14:hiddenLine xmlns="" xmlns:a14="http://schemas.microsoft.com/office/drawing/2010/main" w="9525">
                     <a:solidFill>
                       <a:srgbClr val="000000"/>
                     </a:solidFill>
@@ -10626,7 +10626,7 @@
               </a:ln>
               <a:extLst>
                 <a:ext uri="{91240B29-F687-4f45-9708-019B960494DF}">
-                  <a14:hiddenLine xmlns:a14="http://schemas.microsoft.com/office/drawing/2010/main" xmlns="" w="9525">
+                  <a14:hiddenLine xmlns="" xmlns:a14="http://schemas.microsoft.com/office/drawing/2010/main" w="9525">
                     <a:solidFill>
                       <a:srgbClr val="000000"/>
                     </a:solidFill>
@@ -10716,7 +10716,7 @@
               </a:ln>
               <a:extLst>
                 <a:ext uri="{91240B29-F687-4f45-9708-019B960494DF}">
-                  <a14:hiddenLine xmlns:a14="http://schemas.microsoft.com/office/drawing/2010/main" xmlns="" w="9525">
+                  <a14:hiddenLine xmlns="" xmlns:a14="http://schemas.microsoft.com/office/drawing/2010/main" w="9525">
                     <a:solidFill>
                       <a:srgbClr val="000000"/>
                     </a:solidFill>
@@ -10806,7 +10806,7 @@
               </a:ln>
               <a:extLst>
                 <a:ext uri="{91240B29-F687-4f45-9708-019B960494DF}">
-                  <a14:hiddenLine xmlns:a14="http://schemas.microsoft.com/office/drawing/2010/main" xmlns="" w="9525">
+                  <a14:hiddenLine xmlns="" xmlns:a14="http://schemas.microsoft.com/office/drawing/2010/main" w="9525">
                     <a:solidFill>
                       <a:srgbClr val="000000"/>
                     </a:solidFill>
@@ -10871,7 +10871,7 @@
               </a:ln>
               <a:extLst>
                 <a:ext uri="{91240B29-F687-4f45-9708-019B960494DF}">
-                  <a14:hiddenLine xmlns:a14="http://schemas.microsoft.com/office/drawing/2010/main" xmlns="" w="9525">
+                  <a14:hiddenLine xmlns="" xmlns:a14="http://schemas.microsoft.com/office/drawing/2010/main" w="9525">
                     <a:solidFill>
                       <a:srgbClr val="000000"/>
                     </a:solidFill>
@@ -10991,7 +10991,7 @@
               </a:ln>
               <a:extLst>
                 <a:ext uri="{91240B29-F687-4f45-9708-019B960494DF}">
-                  <a14:hiddenLine xmlns:a14="http://schemas.microsoft.com/office/drawing/2010/main" xmlns="" w="9525">
+                  <a14:hiddenLine xmlns="" xmlns:a14="http://schemas.microsoft.com/office/drawing/2010/main" w="9525">
                     <a:solidFill>
                       <a:srgbClr val="000000"/>
                     </a:solidFill>
@@ -11089,7 +11089,7 @@
               </a:ln>
               <a:extLst>
                 <a:ext uri="{91240B29-F687-4f45-9708-019B960494DF}">
-                  <a14:hiddenLine xmlns:a14="http://schemas.microsoft.com/office/drawing/2010/main" xmlns="" w="9525">
+                  <a14:hiddenLine xmlns="" xmlns:a14="http://schemas.microsoft.com/office/drawing/2010/main" w="9525">
                     <a:solidFill>
                       <a:srgbClr val="000000"/>
                     </a:solidFill>
@@ -11204,7 +11204,7 @@
               </a:ln>
               <a:extLst>
                 <a:ext uri="{91240B29-F687-4f45-9708-019B960494DF}">
-                  <a14:hiddenLine xmlns:a14="http://schemas.microsoft.com/office/drawing/2010/main" xmlns="" w="9525">
+                  <a14:hiddenLine xmlns="" xmlns:a14="http://schemas.microsoft.com/office/drawing/2010/main" w="9525">
                     <a:solidFill>
                       <a:srgbClr val="000000"/>
                     </a:solidFill>
@@ -11294,7 +11294,7 @@
               </a:ln>
               <a:extLst>
                 <a:ext uri="{91240B29-F687-4f45-9708-019B960494DF}">
-                  <a14:hiddenLine xmlns:a14="http://schemas.microsoft.com/office/drawing/2010/main" xmlns="" w="9525">
+                  <a14:hiddenLine xmlns="" xmlns:a14="http://schemas.microsoft.com/office/drawing/2010/main" w="9525">
                     <a:solidFill>
                       <a:srgbClr val="000000"/>
                     </a:solidFill>
@@ -11359,7 +11359,7 @@
               </a:ln>
               <a:extLst>
                 <a:ext uri="{91240B29-F687-4f45-9708-019B960494DF}">
-                  <a14:hiddenLine xmlns:a14="http://schemas.microsoft.com/office/drawing/2010/main" xmlns="" w="9525">
+                  <a14:hiddenLine xmlns="" xmlns:a14="http://schemas.microsoft.com/office/drawing/2010/main" w="9525">
                     <a:solidFill>
                       <a:srgbClr val="000000"/>
                     </a:solidFill>
@@ -11449,7 +11449,7 @@
               </a:ln>
               <a:extLst>
                 <a:ext uri="{91240B29-F687-4f45-9708-019B960494DF}">
-                  <a14:hiddenLine xmlns:a14="http://schemas.microsoft.com/office/drawing/2010/main" xmlns="" w="9525">
+                  <a14:hiddenLine xmlns="" xmlns:a14="http://schemas.microsoft.com/office/drawing/2010/main" w="9525">
                     <a:solidFill>
                       <a:srgbClr val="000000"/>
                     </a:solidFill>
@@ -11517,7 +11517,7 @@
               </a:ln>
               <a:extLst>
                 <a:ext uri="{91240B29-F687-4f45-9708-019B960494DF}">
-                  <a14:hiddenLine xmlns:a14="http://schemas.microsoft.com/office/drawing/2010/main" xmlns="" w="9525">
+                  <a14:hiddenLine xmlns="" xmlns:a14="http://schemas.microsoft.com/office/drawing/2010/main" w="9525">
                     <a:solidFill>
                       <a:srgbClr val="000000"/>
                     </a:solidFill>
@@ -11607,7 +11607,7 @@
               </a:ln>
               <a:extLst>
                 <a:ext uri="{91240B29-F687-4f45-9708-019B960494DF}">
-                  <a14:hiddenLine xmlns:a14="http://schemas.microsoft.com/office/drawing/2010/main" xmlns="" w="9525">
+                  <a14:hiddenLine xmlns="" xmlns:a14="http://schemas.microsoft.com/office/drawing/2010/main" w="9525">
                     <a:solidFill>
                       <a:srgbClr val="000000"/>
                     </a:solidFill>
@@ -11675,7 +11675,7 @@
               </a:ln>
               <a:extLst>
                 <a:ext uri="{91240B29-F687-4f45-9708-019B960494DF}">
-                  <a14:hiddenLine xmlns:a14="http://schemas.microsoft.com/office/drawing/2010/main" xmlns="" w="9525">
+                  <a14:hiddenLine xmlns="" xmlns:a14="http://schemas.microsoft.com/office/drawing/2010/main" w="9525">
                     <a:solidFill>
                       <a:srgbClr val="000000"/>
                     </a:solidFill>
@@ -11765,7 +11765,7 @@
               </a:ln>
               <a:extLst>
                 <a:ext uri="{91240B29-F687-4f45-9708-019B960494DF}">
-                  <a14:hiddenLine xmlns:a14="http://schemas.microsoft.com/office/drawing/2010/main" xmlns="" w="9525">
+                  <a14:hiddenLine xmlns="" xmlns:a14="http://schemas.microsoft.com/office/drawing/2010/main" w="9525">
                     <a:solidFill>
                       <a:srgbClr val="000000"/>
                     </a:solidFill>
@@ -11799,7 +11799,7 @@
               </a:ln>
               <a:extLst>
                 <a:ext uri="{91240B29-F687-4f45-9708-019B960494DF}">
-                  <a14:hiddenLine xmlns:a14="http://schemas.microsoft.com/office/drawing/2010/main" xmlns="" w="9525">
+                  <a14:hiddenLine xmlns="" xmlns:a14="http://schemas.microsoft.com/office/drawing/2010/main" w="9525">
                     <a:solidFill>
                       <a:srgbClr val="000000"/>
                     </a:solidFill>
@@ -11940,7 +11940,7 @@
             <a:fld id="{48A87A34-81AB-432B-8DAE-1953F412C126}" type="datetimeFigureOut">
               <a:rPr lang="en-US" dirty="0"/>
               <a:pPr/>
-              <a:t>2/26/2018</a:t>
+              <a:t>3/7/2018</a:t>
             </a:fld>
             <a:endParaRPr lang="en-US" dirty="0"/>
           </a:p>
@@ -12392,27 +12392,42 @@
         </p:nvSpPr>
         <p:spPr/>
         <p:txBody>
-          <a:bodyPr/>
+          <a:bodyPr>
+            <a:normAutofit fontScale="62500" lnSpcReduction="20000"/>
+          </a:bodyPr>
           <a:lstStyle/>
           <a:p>
             <a:r>
               <a:rPr lang="en-US" dirty="0" smtClean="0"/>
-              <a:t>Rev 0	02.26.18	Preliminary.				</a:t>
-            </a:r>
+              <a:t>Rev 0	02.26.18		Preliminary.					BL</a:t>
+            </a:r>
+          </a:p>
+          <a:p>
             <a:r>
               <a:rPr lang="en-US" dirty="0" smtClean="0"/>
-              <a:t>BL</a:t>
-            </a:r>
-          </a:p>
-          <a:p>
+              <a:t>Rev 1	02.26.18		Added photos		</a:t>
+            </a:r>
+            <a:r>
+              <a:rPr lang="en-US" dirty="0"/>
+              <a:t>	</a:t>
+            </a:r>
             <a:r>
               <a:rPr lang="en-US" dirty="0" smtClean="0"/>
-              <a:t>Rev 1	02.26.18	Added photos				</a:t>
+              <a:t>	</a:t>
             </a:r>
             <a:r>
               <a:rPr lang="en-US" dirty="0" err="1" smtClean="0"/>
-              <a:t>bl</a:t>
-            </a:r>
+              <a:t>bL</a:t>
+            </a:r>
+            <a:endParaRPr lang="en-US" dirty="0" smtClean="0"/>
+          </a:p>
+          <a:p>
+            <a:r>
+              <a:rPr lang="en-US" dirty="0" smtClean="0"/>
+              <a:t>Rev -	03.26.18		Release					BL</a:t>
+            </a:r>
+          </a:p>
+          <a:p>
             <a:endParaRPr lang="en-US" dirty="0" smtClean="0"/>
           </a:p>
           <a:p>
@@ -12502,9 +12517,24 @@
           <a:p>
             <a:r>
               <a:rPr lang="en-US" dirty="0" smtClean="0"/>
-              <a:t>Coming Soon</a:t>
-            </a:r>
-            <a:endParaRPr lang="en-US" dirty="0"/>
+              <a:t>Download “build” </a:t>
+            </a:r>
+            <a:r>
+              <a:rPr lang="en-US" dirty="0"/>
+              <a:t>folder from Z:\FTP\RNDFtp\EQD\FA </a:t>
+            </a:r>
+            <a:r>
+              <a:rPr lang="en-US" dirty="0" smtClean="0"/>
+              <a:t>Procedure\</a:t>
+            </a:r>
+            <a:r>
+              <a:rPr lang="en-US" dirty="0" err="1" smtClean="0"/>
+              <a:t>PIP_Generator</a:t>
+            </a:r>
+            <a:r>
+              <a:rPr lang="en-US" dirty="0" smtClean="0"/>
+              <a:t> onto your desktop</a:t>
+            </a:r>
           </a:p>
         </p:txBody>
       </p:sp>
@@ -12582,19 +12612,43 @@
         <p:spPr/>
         <p:txBody>
           <a:bodyPr>
-            <a:normAutofit lnSpcReduction="10000"/>
+            <a:normAutofit fontScale="70000" lnSpcReduction="20000"/>
           </a:bodyPr>
           <a:lstStyle/>
           <a:p>
             <a:r>
+              <a:rPr lang="en-US" dirty="0"/>
+              <a:t>Navigate to </a:t>
+            </a:r>
+            <a:r>
               <a:rPr lang="en-US" dirty="0" smtClean="0"/>
-              <a:t>Click the “PIP_GEN_id-0_launcher”</a:t>
-            </a:r>
-          </a:p>
-          <a:p>
+              <a:t>“*\Desktop\build\exe.win-amd64-3.6</a:t>
+            </a:r>
             <a:r>
               <a:rPr lang="en-US" dirty="0" smtClean="0"/>
-              <a:t>Drag the x.xml document into the generator window and an Excel document will open with steps for inspection based on function</a:t>
+              <a:t>” folder that was downloaded</a:t>
+            </a:r>
+          </a:p>
+          <a:p>
+            <a:r>
+              <a:rPr lang="en-US" dirty="0" smtClean="0"/>
+              <a:t>Double click </a:t>
+            </a:r>
+            <a:r>
+              <a:rPr lang="en-US" dirty="0" smtClean="0"/>
+              <a:t>the “PIP_GEN_id-0” application</a:t>
+            </a:r>
+          </a:p>
+          <a:p>
+            <a:r>
+              <a:rPr lang="en-US" dirty="0" smtClean="0"/>
+              <a:t>Drag the x.xml document into the generator window and verify that this window is active</a:t>
+            </a:r>
+          </a:p>
+          <a:p>
+            <a:r>
+              <a:rPr lang="en-US" dirty="0" smtClean="0"/>
+              <a:t>Press Enter and an Excel document will open with steps for inspection based on function</a:t>
             </a:r>
           </a:p>
           <a:p>
@@ -12606,17 +12660,45 @@
           <a:p>
             <a:r>
               <a:rPr lang="en-US" dirty="0" smtClean="0"/>
-              <a:t>Generator will create one PIP at a time</a:t>
-            </a:r>
-          </a:p>
-          <a:p>
+              <a:t>NOTE</a:t>
+            </a:r>
+            <a:r>
+              <a:rPr lang="en-US" dirty="0" smtClean="0"/>
+              <a:t>:</a:t>
+            </a:r>
+          </a:p>
+          <a:p>
+            <a:pPr lvl="1"/>
+            <a:r>
+              <a:rPr lang="en-US" dirty="0" smtClean="0"/>
+              <a:t>Create shortcut if </a:t>
+            </a:r>
+            <a:r>
+              <a:rPr lang="en-US" smtClean="0"/>
+              <a:t>you choose</a:t>
+            </a:r>
+            <a:endParaRPr lang="en-US" dirty="0" smtClean="0"/>
+          </a:p>
+          <a:p>
+            <a:pPr lvl="1"/>
+            <a:r>
+              <a:rPr lang="en-US" dirty="0" smtClean="0"/>
+              <a:t>Generator will create one PIP called “Parts – Consoles.xlsx” at a time</a:t>
+            </a:r>
+          </a:p>
+          <a:p>
+            <a:pPr lvl="1"/>
+            <a:r>
+              <a:rPr lang="en-US" dirty="0" smtClean="0"/>
+              <a:t>“ConsoleProcedures.xlsx” database will be updatable</a:t>
+            </a:r>
+          </a:p>
+          <a:p>
+            <a:pPr lvl="1"/>
             <a:r>
               <a:rPr lang="en-US" dirty="0" smtClean="0"/>
               <a:t>If the PIP fails to generate, contact Icon QC with details</a:t>
             </a:r>
-          </a:p>
-          <a:p>
-            <a:endParaRPr lang="en-US" dirty="0" smtClean="0"/>
           </a:p>
           <a:p>
             <a:endParaRPr lang="en-US" dirty="0"/>

</xml_diff>